<commit_message>
Finished the visual stop signal task
</commit_message>
<xml_diff>
--- a/docs/vstopsignal/Images.pptx
+++ b/docs/vstopsignal/Images.pptx
@@ -11,10 +11,9 @@
     <p:sldId id="259" r:id="rId5"/>
     <p:sldId id="260" r:id="rId6"/>
     <p:sldId id="261" r:id="rId7"/>
-    <p:sldId id="262" r:id="rId8"/>
+    <p:sldId id="265" r:id="rId8"/>
     <p:sldId id="263" r:id="rId9"/>
     <p:sldId id="264" r:id="rId10"/>
-    <p:sldId id="265" r:id="rId11"/>
   </p:sldIdLst>
   <p:sldSz cx="12192000" cy="6858000"/>
   <p:notesSz cx="6858000" cy="9144000"/>
@@ -621,7 +620,460 @@
 </p:sld>
 </file>
 
-<file path=ppt/slides/slide10.xml><?xml version="1.0" encoding="utf-8"?>
+<file path=ppt/slides/slide2.xml><?xml version="1.0" encoding="utf-8"?>
+<p:sld xmlns:a="http://schemas.openxmlformats.org/drawingml/2006/main" xmlns:r="http://schemas.openxmlformats.org/officeDocument/2006/relationships" xmlns:p="http://schemas.openxmlformats.org/presentationml/2006/main">
+  <p:cSld>
+    <p:spTree>
+      <p:nvGrpSpPr>
+        <p:cNvPr id="1" name=""/>
+        <p:cNvGrpSpPr/>
+        <p:nvPr/>
+      </p:nvGrpSpPr>
+      <p:grpSpPr>
+        <a:xfrm>
+          <a:off x="0" y="0"/>
+          <a:ext cx="0" cy="0"/>
+          <a:chOff x="0" y="0"/>
+          <a:chExt cx="0" cy="0"/>
+        </a:xfrm>
+      </p:grpSpPr>
+      <p:pic>
+        <p:nvPicPr>
+          <p:cNvPr id="5" name="Graphic 4" descr="Arrow Right with solid fill">
+            <a:extLst>
+              <a:ext uri="{FF2B5EF4-FFF2-40B4-BE49-F238E27FC236}">
+                <a16:creationId xmlns:a16="http://schemas.microsoft.com/office/drawing/2014/main" id="{85DD57C8-84A2-3C4D-9EE3-9FD23959280A}"/>
+              </a:ext>
+            </a:extLst>
+          </p:cNvPr>
+          <p:cNvPicPr>
+            <a:picLocks noChangeAspect="1"/>
+          </p:cNvPicPr>
+          <p:nvPr/>
+        </p:nvPicPr>
+        <p:blipFill>
+          <a:blip r:embed="rId2">
+            <a:extLst>
+              <a:ext uri="{28A0092B-C50C-407E-A947-70E740481C1C}">
+                <a14:useLocalDpi xmlns:a14="http://schemas.microsoft.com/office/drawing/2010/main" val="0"/>
+              </a:ext>
+              <a:ext uri="{96DAC541-7B7A-43D3-8B79-37D633B846F1}">
+                <asvg:svgBlip xmlns:asvg="http://schemas.microsoft.com/office/drawing/2016/SVG/main" r:embed="rId3"/>
+              </a:ext>
+            </a:extLst>
+          </a:blip>
+          <a:stretch>
+            <a:fillRect/>
+          </a:stretch>
+        </p:blipFill>
+        <p:spPr>
+          <a:xfrm rot="10800000">
+            <a:off x="5218386" y="2551386"/>
+            <a:ext cx="1755228" cy="1755228"/>
+          </a:xfrm>
+          <a:prstGeom prst="rect">
+            <a:avLst/>
+          </a:prstGeom>
+        </p:spPr>
+      </p:pic>
+    </p:spTree>
+    <p:extLst>
+      <p:ext uri="{BB962C8B-B14F-4D97-AF65-F5344CB8AC3E}">
+        <p14:creationId xmlns:p14="http://schemas.microsoft.com/office/powerpoint/2010/main" val="4022880944"/>
+      </p:ext>
+    </p:extLst>
+  </p:cSld>
+  <p:clrMapOvr>
+    <a:masterClrMapping/>
+  </p:clrMapOvr>
+</p:sld>
+</file>
+
+<file path=ppt/slides/slide3.xml><?xml version="1.0" encoding="utf-8"?>
+<p:sld xmlns:a="http://schemas.openxmlformats.org/drawingml/2006/main" xmlns:r="http://schemas.openxmlformats.org/officeDocument/2006/relationships" xmlns:p="http://schemas.openxmlformats.org/presentationml/2006/main">
+  <p:cSld>
+    <p:spTree>
+      <p:nvGrpSpPr>
+        <p:cNvPr id="1" name=""/>
+        <p:cNvGrpSpPr/>
+        <p:nvPr/>
+      </p:nvGrpSpPr>
+      <p:grpSpPr>
+        <a:xfrm>
+          <a:off x="0" y="0"/>
+          <a:ext cx="0" cy="0"/>
+          <a:chOff x="0" y="0"/>
+          <a:chExt cx="0" cy="0"/>
+        </a:xfrm>
+      </p:grpSpPr>
+      <p:sp>
+        <p:nvSpPr>
+          <p:cNvPr id="2" name="Oval 1">
+            <a:extLst>
+              <a:ext uri="{FF2B5EF4-FFF2-40B4-BE49-F238E27FC236}">
+                <a16:creationId xmlns:a16="http://schemas.microsoft.com/office/drawing/2014/main" id="{0A722210-63FD-96BA-3395-F8365DF1907F}"/>
+              </a:ext>
+            </a:extLst>
+          </p:cNvPr>
+          <p:cNvSpPr/>
+          <p:nvPr/>
+        </p:nvSpPr>
+        <p:spPr>
+          <a:xfrm>
+            <a:off x="4564115" y="1941786"/>
+            <a:ext cx="3063767" cy="2974428"/>
+          </a:xfrm>
+          <a:prstGeom prst="ellipse">
+            <a:avLst/>
+          </a:prstGeom>
+          <a:solidFill>
+            <a:srgbClr val="FF0000"/>
+          </a:solidFill>
+        </p:spPr>
+        <p:style>
+          <a:lnRef idx="2">
+            <a:schemeClr val="accent1">
+              <a:shade val="15000"/>
+            </a:schemeClr>
+          </a:lnRef>
+          <a:fillRef idx="1">
+            <a:schemeClr val="accent1"/>
+          </a:fillRef>
+          <a:effectRef idx="0">
+            <a:schemeClr val="accent1"/>
+          </a:effectRef>
+          <a:fontRef idx="minor">
+            <a:schemeClr val="lt1"/>
+          </a:fontRef>
+        </p:style>
+        <p:txBody>
+          <a:bodyPr rtlCol="0" anchor="ctr"/>
+          <a:lstStyle/>
+          <a:p>
+            <a:pPr algn="ctr"/>
+            <a:endParaRPr lang="en-DK"/>
+          </a:p>
+        </p:txBody>
+      </p:sp>
+      <p:pic>
+        <p:nvPicPr>
+          <p:cNvPr id="5" name="Graphic 4" descr="Arrow Right with solid fill">
+            <a:extLst>
+              <a:ext uri="{FF2B5EF4-FFF2-40B4-BE49-F238E27FC236}">
+                <a16:creationId xmlns:a16="http://schemas.microsoft.com/office/drawing/2014/main" id="{85DD57C8-84A2-3C4D-9EE3-9FD23959280A}"/>
+              </a:ext>
+            </a:extLst>
+          </p:cNvPr>
+          <p:cNvPicPr>
+            <a:picLocks noChangeAspect="1"/>
+          </p:cNvPicPr>
+          <p:nvPr/>
+        </p:nvPicPr>
+        <p:blipFill>
+          <a:blip r:embed="rId2">
+            <a:extLst>
+              <a:ext uri="{28A0092B-C50C-407E-A947-70E740481C1C}">
+                <a14:useLocalDpi xmlns:a14="http://schemas.microsoft.com/office/drawing/2010/main" val="0"/>
+              </a:ext>
+              <a:ext uri="{96DAC541-7B7A-43D3-8B79-37D633B846F1}">
+                <asvg:svgBlip xmlns:asvg="http://schemas.microsoft.com/office/drawing/2016/SVG/main" r:embed="rId3"/>
+              </a:ext>
+            </a:extLst>
+          </a:blip>
+          <a:stretch>
+            <a:fillRect/>
+          </a:stretch>
+        </p:blipFill>
+        <p:spPr>
+          <a:xfrm>
+            <a:off x="5218386" y="2551386"/>
+            <a:ext cx="1755228" cy="1755228"/>
+          </a:xfrm>
+          <a:prstGeom prst="rect">
+            <a:avLst/>
+          </a:prstGeom>
+        </p:spPr>
+      </p:pic>
+    </p:spTree>
+    <p:extLst>
+      <p:ext uri="{BB962C8B-B14F-4D97-AF65-F5344CB8AC3E}">
+        <p14:creationId xmlns:p14="http://schemas.microsoft.com/office/powerpoint/2010/main" val="1237521980"/>
+      </p:ext>
+    </p:extLst>
+  </p:cSld>
+  <p:clrMapOvr>
+    <a:masterClrMapping/>
+  </p:clrMapOvr>
+</p:sld>
+</file>
+
+<file path=ppt/slides/slide4.xml><?xml version="1.0" encoding="utf-8"?>
+<p:sld xmlns:a="http://schemas.openxmlformats.org/drawingml/2006/main" xmlns:r="http://schemas.openxmlformats.org/officeDocument/2006/relationships" xmlns:p="http://schemas.openxmlformats.org/presentationml/2006/main">
+  <p:cSld>
+    <p:spTree>
+      <p:nvGrpSpPr>
+        <p:cNvPr id="1" name=""/>
+        <p:cNvGrpSpPr/>
+        <p:nvPr/>
+      </p:nvGrpSpPr>
+      <p:grpSpPr>
+        <a:xfrm>
+          <a:off x="0" y="0"/>
+          <a:ext cx="0" cy="0"/>
+          <a:chOff x="0" y="0"/>
+          <a:chExt cx="0" cy="0"/>
+        </a:xfrm>
+      </p:grpSpPr>
+      <p:sp>
+        <p:nvSpPr>
+          <p:cNvPr id="2" name="Oval 1">
+            <a:extLst>
+              <a:ext uri="{FF2B5EF4-FFF2-40B4-BE49-F238E27FC236}">
+                <a16:creationId xmlns:a16="http://schemas.microsoft.com/office/drawing/2014/main" id="{32DB62A2-3C3B-83E1-5222-1E4C9F5D5285}"/>
+              </a:ext>
+            </a:extLst>
+          </p:cNvPr>
+          <p:cNvSpPr/>
+          <p:nvPr/>
+        </p:nvSpPr>
+        <p:spPr>
+          <a:xfrm>
+            <a:off x="4564115" y="1941786"/>
+            <a:ext cx="3063767" cy="2974428"/>
+          </a:xfrm>
+          <a:prstGeom prst="ellipse">
+            <a:avLst/>
+          </a:prstGeom>
+          <a:solidFill>
+            <a:srgbClr val="FF0000"/>
+          </a:solidFill>
+        </p:spPr>
+        <p:style>
+          <a:lnRef idx="2">
+            <a:schemeClr val="accent1">
+              <a:shade val="15000"/>
+            </a:schemeClr>
+          </a:lnRef>
+          <a:fillRef idx="1">
+            <a:schemeClr val="accent1"/>
+          </a:fillRef>
+          <a:effectRef idx="0">
+            <a:schemeClr val="accent1"/>
+          </a:effectRef>
+          <a:fontRef idx="minor">
+            <a:schemeClr val="lt1"/>
+          </a:fontRef>
+        </p:style>
+        <p:txBody>
+          <a:bodyPr rtlCol="0" anchor="ctr"/>
+          <a:lstStyle/>
+          <a:p>
+            <a:pPr algn="ctr"/>
+            <a:endParaRPr lang="en-DK"/>
+          </a:p>
+        </p:txBody>
+      </p:sp>
+      <p:pic>
+        <p:nvPicPr>
+          <p:cNvPr id="5" name="Graphic 4" descr="Arrow Right with solid fill">
+            <a:extLst>
+              <a:ext uri="{FF2B5EF4-FFF2-40B4-BE49-F238E27FC236}">
+                <a16:creationId xmlns:a16="http://schemas.microsoft.com/office/drawing/2014/main" id="{85DD57C8-84A2-3C4D-9EE3-9FD23959280A}"/>
+              </a:ext>
+            </a:extLst>
+          </p:cNvPr>
+          <p:cNvPicPr>
+            <a:picLocks noChangeAspect="1"/>
+          </p:cNvPicPr>
+          <p:nvPr/>
+        </p:nvPicPr>
+        <p:blipFill>
+          <a:blip r:embed="rId2">
+            <a:extLst>
+              <a:ext uri="{28A0092B-C50C-407E-A947-70E740481C1C}">
+                <a14:useLocalDpi xmlns:a14="http://schemas.microsoft.com/office/drawing/2010/main" val="0"/>
+              </a:ext>
+              <a:ext uri="{96DAC541-7B7A-43D3-8B79-37D633B846F1}">
+                <asvg:svgBlip xmlns:asvg="http://schemas.microsoft.com/office/drawing/2016/SVG/main" r:embed="rId3"/>
+              </a:ext>
+            </a:extLst>
+          </a:blip>
+          <a:stretch>
+            <a:fillRect/>
+          </a:stretch>
+        </p:blipFill>
+        <p:spPr>
+          <a:xfrm rot="10800000">
+            <a:off x="5218386" y="2551386"/>
+            <a:ext cx="1755228" cy="1755228"/>
+          </a:xfrm>
+          <a:prstGeom prst="rect">
+            <a:avLst/>
+          </a:prstGeom>
+        </p:spPr>
+      </p:pic>
+    </p:spTree>
+    <p:extLst>
+      <p:ext uri="{BB962C8B-B14F-4D97-AF65-F5344CB8AC3E}">
+        <p14:creationId xmlns:p14="http://schemas.microsoft.com/office/powerpoint/2010/main" val="2067269519"/>
+      </p:ext>
+    </p:extLst>
+  </p:cSld>
+  <p:clrMapOvr>
+    <a:masterClrMapping/>
+  </p:clrMapOvr>
+</p:sld>
+</file>
+
+<file path=ppt/slides/slide5.xml><?xml version="1.0" encoding="utf-8"?>
+<p:sld xmlns:a="http://schemas.openxmlformats.org/drawingml/2006/main" xmlns:r="http://schemas.openxmlformats.org/officeDocument/2006/relationships" xmlns:p="http://schemas.openxmlformats.org/presentationml/2006/main">
+  <p:cSld>
+    <p:spTree>
+      <p:nvGrpSpPr>
+        <p:cNvPr id="1" name=""/>
+        <p:cNvGrpSpPr/>
+        <p:nvPr/>
+      </p:nvGrpSpPr>
+      <p:grpSpPr>
+        <a:xfrm>
+          <a:off x="0" y="0"/>
+          <a:ext cx="0" cy="0"/>
+          <a:chOff x="0" y="0"/>
+          <a:chExt cx="0" cy="0"/>
+        </a:xfrm>
+      </p:grpSpPr>
+      <p:sp>
+        <p:nvSpPr>
+          <p:cNvPr id="2" name="TextBox 1">
+            <a:extLst>
+              <a:ext uri="{FF2B5EF4-FFF2-40B4-BE49-F238E27FC236}">
+                <a16:creationId xmlns:a16="http://schemas.microsoft.com/office/drawing/2014/main" id="{39D9F032-BA88-C233-03A9-217FFC9335E9}"/>
+              </a:ext>
+            </a:extLst>
+          </p:cNvPr>
+          <p:cNvSpPr txBox="1"/>
+          <p:nvPr/>
+        </p:nvSpPr>
+        <p:spPr>
+          <a:xfrm>
+            <a:off x="2371903" y="2228671"/>
+            <a:ext cx="7448193" cy="2400657"/>
+          </a:xfrm>
+          <a:prstGeom prst="rect">
+            <a:avLst/>
+          </a:prstGeom>
+          <a:noFill/>
+        </p:spPr>
+        <p:txBody>
+          <a:bodyPr wrap="none" rtlCol="0">
+            <a:spAutoFit/>
+          </a:bodyPr>
+          <a:lstStyle/>
+          <a:p>
+            <a:r>
+              <a:rPr lang="en-GB" sz="15000" dirty="0">
+                <a:solidFill>
+                  <a:srgbClr val="92D050"/>
+                </a:solidFill>
+              </a:rPr>
+              <a:t>CORRECT</a:t>
+            </a:r>
+            <a:endParaRPr lang="en-DK" sz="15000" dirty="0">
+              <a:solidFill>
+                <a:srgbClr val="92D050"/>
+              </a:solidFill>
+            </a:endParaRPr>
+          </a:p>
+        </p:txBody>
+      </p:sp>
+    </p:spTree>
+    <p:extLst>
+      <p:ext uri="{BB962C8B-B14F-4D97-AF65-F5344CB8AC3E}">
+        <p14:creationId xmlns:p14="http://schemas.microsoft.com/office/powerpoint/2010/main" val="3433367663"/>
+      </p:ext>
+    </p:extLst>
+  </p:cSld>
+  <p:clrMapOvr>
+    <a:masterClrMapping/>
+  </p:clrMapOvr>
+</p:sld>
+</file>
+
+<file path=ppt/slides/slide6.xml><?xml version="1.0" encoding="utf-8"?>
+<p:sld xmlns:a="http://schemas.openxmlformats.org/drawingml/2006/main" xmlns:r="http://schemas.openxmlformats.org/officeDocument/2006/relationships" xmlns:p="http://schemas.openxmlformats.org/presentationml/2006/main">
+  <p:cSld>
+    <p:spTree>
+      <p:nvGrpSpPr>
+        <p:cNvPr id="1" name=""/>
+        <p:cNvGrpSpPr/>
+        <p:nvPr/>
+      </p:nvGrpSpPr>
+      <p:grpSpPr>
+        <a:xfrm>
+          <a:off x="0" y="0"/>
+          <a:ext cx="0" cy="0"/>
+          <a:chOff x="0" y="0"/>
+          <a:chExt cx="0" cy="0"/>
+        </a:xfrm>
+      </p:grpSpPr>
+      <p:sp>
+        <p:nvSpPr>
+          <p:cNvPr id="2" name="TextBox 1">
+            <a:extLst>
+              <a:ext uri="{FF2B5EF4-FFF2-40B4-BE49-F238E27FC236}">
+                <a16:creationId xmlns:a16="http://schemas.microsoft.com/office/drawing/2014/main" id="{39D9F032-BA88-C233-03A9-217FFC9335E9}"/>
+              </a:ext>
+            </a:extLst>
+          </p:cNvPr>
+          <p:cNvSpPr txBox="1"/>
+          <p:nvPr/>
+        </p:nvSpPr>
+        <p:spPr>
+          <a:xfrm>
+            <a:off x="2769384" y="2228671"/>
+            <a:ext cx="6653232" cy="2400657"/>
+          </a:xfrm>
+          <a:prstGeom prst="rect">
+            <a:avLst/>
+          </a:prstGeom>
+          <a:noFill/>
+        </p:spPr>
+        <p:txBody>
+          <a:bodyPr wrap="none" rtlCol="0">
+            <a:spAutoFit/>
+          </a:bodyPr>
+          <a:lstStyle/>
+          <a:p>
+            <a:r>
+              <a:rPr lang="en-GB" sz="15000" dirty="0">
+                <a:solidFill>
+                  <a:srgbClr val="FF0000"/>
+                </a:solidFill>
+              </a:rPr>
+              <a:t>WRONG</a:t>
+            </a:r>
+            <a:endParaRPr lang="en-DK" sz="15000" dirty="0">
+              <a:solidFill>
+                <a:srgbClr val="FF0000"/>
+              </a:solidFill>
+            </a:endParaRPr>
+          </a:p>
+        </p:txBody>
+      </p:sp>
+    </p:spTree>
+    <p:extLst>
+      <p:ext uri="{BB962C8B-B14F-4D97-AF65-F5344CB8AC3E}">
+        <p14:creationId xmlns:p14="http://schemas.microsoft.com/office/powerpoint/2010/main" val="3340757031"/>
+      </p:ext>
+    </p:extLst>
+  </p:cSld>
+  <p:clrMapOvr>
+    <a:masterClrMapping/>
+  </p:clrMapOvr>
+</p:sld>
+</file>
+
+<file path=ppt/slides/slide7.xml><?xml version="1.0" encoding="utf-8"?>
 <p:sld xmlns:a="http://schemas.openxmlformats.org/drawingml/2006/main" xmlns:r="http://schemas.openxmlformats.org/officeDocument/2006/relationships" xmlns:p="http://schemas.openxmlformats.org/presentationml/2006/main">
   <p:cSld>
     <p:spTree>
@@ -730,577 +1182,6 @@
     <p:extLst>
       <p:ext uri="{BB962C8B-B14F-4D97-AF65-F5344CB8AC3E}">
         <p14:creationId xmlns:p14="http://schemas.microsoft.com/office/powerpoint/2010/main" val="3297780617"/>
-      </p:ext>
-    </p:extLst>
-  </p:cSld>
-  <p:clrMapOvr>
-    <a:masterClrMapping/>
-  </p:clrMapOvr>
-</p:sld>
-</file>
-
-<file path=ppt/slides/slide2.xml><?xml version="1.0" encoding="utf-8"?>
-<p:sld xmlns:a="http://schemas.openxmlformats.org/drawingml/2006/main" xmlns:r="http://schemas.openxmlformats.org/officeDocument/2006/relationships" xmlns:p="http://schemas.openxmlformats.org/presentationml/2006/main">
-  <p:cSld>
-    <p:spTree>
-      <p:nvGrpSpPr>
-        <p:cNvPr id="1" name=""/>
-        <p:cNvGrpSpPr/>
-        <p:nvPr/>
-      </p:nvGrpSpPr>
-      <p:grpSpPr>
-        <a:xfrm>
-          <a:off x="0" y="0"/>
-          <a:ext cx="0" cy="0"/>
-          <a:chOff x="0" y="0"/>
-          <a:chExt cx="0" cy="0"/>
-        </a:xfrm>
-      </p:grpSpPr>
-      <p:pic>
-        <p:nvPicPr>
-          <p:cNvPr id="5" name="Graphic 4" descr="Arrow Right with solid fill">
-            <a:extLst>
-              <a:ext uri="{FF2B5EF4-FFF2-40B4-BE49-F238E27FC236}">
-                <a16:creationId xmlns:a16="http://schemas.microsoft.com/office/drawing/2014/main" id="{85DD57C8-84A2-3C4D-9EE3-9FD23959280A}"/>
-              </a:ext>
-            </a:extLst>
-          </p:cNvPr>
-          <p:cNvPicPr>
-            <a:picLocks noChangeAspect="1"/>
-          </p:cNvPicPr>
-          <p:nvPr/>
-        </p:nvPicPr>
-        <p:blipFill>
-          <a:blip r:embed="rId2">
-            <a:extLst>
-              <a:ext uri="{28A0092B-C50C-407E-A947-70E740481C1C}">
-                <a14:useLocalDpi xmlns:a14="http://schemas.microsoft.com/office/drawing/2010/main" val="0"/>
-              </a:ext>
-              <a:ext uri="{96DAC541-7B7A-43D3-8B79-37D633B846F1}">
-                <asvg:svgBlip xmlns:asvg="http://schemas.microsoft.com/office/drawing/2016/SVG/main" r:embed="rId3"/>
-              </a:ext>
-            </a:extLst>
-          </a:blip>
-          <a:stretch>
-            <a:fillRect/>
-          </a:stretch>
-        </p:blipFill>
-        <p:spPr>
-          <a:xfrm rot="10800000">
-            <a:off x="5218386" y="2551386"/>
-            <a:ext cx="1755228" cy="1755228"/>
-          </a:xfrm>
-          <a:prstGeom prst="rect">
-            <a:avLst/>
-          </a:prstGeom>
-        </p:spPr>
-      </p:pic>
-    </p:spTree>
-    <p:extLst>
-      <p:ext uri="{BB962C8B-B14F-4D97-AF65-F5344CB8AC3E}">
-        <p14:creationId xmlns:p14="http://schemas.microsoft.com/office/powerpoint/2010/main" val="4022880944"/>
-      </p:ext>
-    </p:extLst>
-  </p:cSld>
-  <p:clrMapOvr>
-    <a:masterClrMapping/>
-  </p:clrMapOvr>
-</p:sld>
-</file>
-
-<file path=ppt/slides/slide3.xml><?xml version="1.0" encoding="utf-8"?>
-<p:sld xmlns:a="http://schemas.openxmlformats.org/drawingml/2006/main" xmlns:r="http://schemas.openxmlformats.org/officeDocument/2006/relationships" xmlns:p="http://schemas.openxmlformats.org/presentationml/2006/main">
-  <p:cSld>
-    <p:spTree>
-      <p:nvGrpSpPr>
-        <p:cNvPr id="1" name=""/>
-        <p:cNvGrpSpPr/>
-        <p:nvPr/>
-      </p:nvGrpSpPr>
-      <p:grpSpPr>
-        <a:xfrm>
-          <a:off x="0" y="0"/>
-          <a:ext cx="0" cy="0"/>
-          <a:chOff x="0" y="0"/>
-          <a:chExt cx="0" cy="0"/>
-        </a:xfrm>
-      </p:grpSpPr>
-      <p:sp>
-        <p:nvSpPr>
-          <p:cNvPr id="2" name="Oval 1">
-            <a:extLst>
-              <a:ext uri="{FF2B5EF4-FFF2-40B4-BE49-F238E27FC236}">
-                <a16:creationId xmlns:a16="http://schemas.microsoft.com/office/drawing/2014/main" id="{0A722210-63FD-96BA-3395-F8365DF1907F}"/>
-              </a:ext>
-            </a:extLst>
-          </p:cNvPr>
-          <p:cNvSpPr/>
-          <p:nvPr/>
-        </p:nvSpPr>
-        <p:spPr>
-          <a:xfrm>
-            <a:off x="4564115" y="1941786"/>
-            <a:ext cx="3063767" cy="2974428"/>
-          </a:xfrm>
-          <a:prstGeom prst="ellipse">
-            <a:avLst/>
-          </a:prstGeom>
-          <a:solidFill>
-            <a:srgbClr val="FF0000"/>
-          </a:solidFill>
-        </p:spPr>
-        <p:style>
-          <a:lnRef idx="2">
-            <a:schemeClr val="accent1">
-              <a:shade val="15000"/>
-            </a:schemeClr>
-          </a:lnRef>
-          <a:fillRef idx="1">
-            <a:schemeClr val="accent1"/>
-          </a:fillRef>
-          <a:effectRef idx="0">
-            <a:schemeClr val="accent1"/>
-          </a:effectRef>
-          <a:fontRef idx="minor">
-            <a:schemeClr val="lt1"/>
-          </a:fontRef>
-        </p:style>
-        <p:txBody>
-          <a:bodyPr rtlCol="0" anchor="ctr"/>
-          <a:lstStyle/>
-          <a:p>
-            <a:pPr algn="ctr"/>
-            <a:endParaRPr lang="en-DK"/>
-          </a:p>
-        </p:txBody>
-      </p:sp>
-      <p:pic>
-        <p:nvPicPr>
-          <p:cNvPr id="5" name="Graphic 4" descr="Arrow Right with solid fill">
-            <a:extLst>
-              <a:ext uri="{FF2B5EF4-FFF2-40B4-BE49-F238E27FC236}">
-                <a16:creationId xmlns:a16="http://schemas.microsoft.com/office/drawing/2014/main" id="{85DD57C8-84A2-3C4D-9EE3-9FD23959280A}"/>
-              </a:ext>
-            </a:extLst>
-          </p:cNvPr>
-          <p:cNvPicPr>
-            <a:picLocks noChangeAspect="1"/>
-          </p:cNvPicPr>
-          <p:nvPr/>
-        </p:nvPicPr>
-        <p:blipFill>
-          <a:blip r:embed="rId2">
-            <a:extLst>
-              <a:ext uri="{28A0092B-C50C-407E-A947-70E740481C1C}">
-                <a14:useLocalDpi xmlns:a14="http://schemas.microsoft.com/office/drawing/2010/main" val="0"/>
-              </a:ext>
-              <a:ext uri="{96DAC541-7B7A-43D3-8B79-37D633B846F1}">
-                <asvg:svgBlip xmlns:asvg="http://schemas.microsoft.com/office/drawing/2016/SVG/main" r:embed="rId3"/>
-              </a:ext>
-            </a:extLst>
-          </a:blip>
-          <a:stretch>
-            <a:fillRect/>
-          </a:stretch>
-        </p:blipFill>
-        <p:spPr>
-          <a:xfrm>
-            <a:off x="5218386" y="2551386"/>
-            <a:ext cx="1755228" cy="1755228"/>
-          </a:xfrm>
-          <a:prstGeom prst="rect">
-            <a:avLst/>
-          </a:prstGeom>
-        </p:spPr>
-      </p:pic>
-    </p:spTree>
-    <p:extLst>
-      <p:ext uri="{BB962C8B-B14F-4D97-AF65-F5344CB8AC3E}">
-        <p14:creationId xmlns:p14="http://schemas.microsoft.com/office/powerpoint/2010/main" val="1237521980"/>
-      </p:ext>
-    </p:extLst>
-  </p:cSld>
-  <p:clrMapOvr>
-    <a:masterClrMapping/>
-  </p:clrMapOvr>
-</p:sld>
-</file>
-
-<file path=ppt/slides/slide4.xml><?xml version="1.0" encoding="utf-8"?>
-<p:sld xmlns:a="http://schemas.openxmlformats.org/drawingml/2006/main" xmlns:r="http://schemas.openxmlformats.org/officeDocument/2006/relationships" xmlns:p="http://schemas.openxmlformats.org/presentationml/2006/main">
-  <p:cSld>
-    <p:spTree>
-      <p:nvGrpSpPr>
-        <p:cNvPr id="1" name=""/>
-        <p:cNvGrpSpPr/>
-        <p:nvPr/>
-      </p:nvGrpSpPr>
-      <p:grpSpPr>
-        <a:xfrm>
-          <a:off x="0" y="0"/>
-          <a:ext cx="0" cy="0"/>
-          <a:chOff x="0" y="0"/>
-          <a:chExt cx="0" cy="0"/>
-        </a:xfrm>
-      </p:grpSpPr>
-      <p:sp>
-        <p:nvSpPr>
-          <p:cNvPr id="2" name="Oval 1">
-            <a:extLst>
-              <a:ext uri="{FF2B5EF4-FFF2-40B4-BE49-F238E27FC236}">
-                <a16:creationId xmlns:a16="http://schemas.microsoft.com/office/drawing/2014/main" id="{32DB62A2-3C3B-83E1-5222-1E4C9F5D5285}"/>
-              </a:ext>
-            </a:extLst>
-          </p:cNvPr>
-          <p:cNvSpPr/>
-          <p:nvPr/>
-        </p:nvSpPr>
-        <p:spPr>
-          <a:xfrm>
-            <a:off x="4564115" y="1941786"/>
-            <a:ext cx="3063767" cy="2974428"/>
-          </a:xfrm>
-          <a:prstGeom prst="ellipse">
-            <a:avLst/>
-          </a:prstGeom>
-          <a:solidFill>
-            <a:srgbClr val="FF0000"/>
-          </a:solidFill>
-        </p:spPr>
-        <p:style>
-          <a:lnRef idx="2">
-            <a:schemeClr val="accent1">
-              <a:shade val="15000"/>
-            </a:schemeClr>
-          </a:lnRef>
-          <a:fillRef idx="1">
-            <a:schemeClr val="accent1"/>
-          </a:fillRef>
-          <a:effectRef idx="0">
-            <a:schemeClr val="accent1"/>
-          </a:effectRef>
-          <a:fontRef idx="minor">
-            <a:schemeClr val="lt1"/>
-          </a:fontRef>
-        </p:style>
-        <p:txBody>
-          <a:bodyPr rtlCol="0" anchor="ctr"/>
-          <a:lstStyle/>
-          <a:p>
-            <a:pPr algn="ctr"/>
-            <a:endParaRPr lang="en-DK"/>
-          </a:p>
-        </p:txBody>
-      </p:sp>
-      <p:pic>
-        <p:nvPicPr>
-          <p:cNvPr id="5" name="Graphic 4" descr="Arrow Right with solid fill">
-            <a:extLst>
-              <a:ext uri="{FF2B5EF4-FFF2-40B4-BE49-F238E27FC236}">
-                <a16:creationId xmlns:a16="http://schemas.microsoft.com/office/drawing/2014/main" id="{85DD57C8-84A2-3C4D-9EE3-9FD23959280A}"/>
-              </a:ext>
-            </a:extLst>
-          </p:cNvPr>
-          <p:cNvPicPr>
-            <a:picLocks noChangeAspect="1"/>
-          </p:cNvPicPr>
-          <p:nvPr/>
-        </p:nvPicPr>
-        <p:blipFill>
-          <a:blip r:embed="rId2">
-            <a:extLst>
-              <a:ext uri="{28A0092B-C50C-407E-A947-70E740481C1C}">
-                <a14:useLocalDpi xmlns:a14="http://schemas.microsoft.com/office/drawing/2010/main" val="0"/>
-              </a:ext>
-              <a:ext uri="{96DAC541-7B7A-43D3-8B79-37D633B846F1}">
-                <asvg:svgBlip xmlns:asvg="http://schemas.microsoft.com/office/drawing/2016/SVG/main" r:embed="rId3"/>
-              </a:ext>
-            </a:extLst>
-          </a:blip>
-          <a:stretch>
-            <a:fillRect/>
-          </a:stretch>
-        </p:blipFill>
-        <p:spPr>
-          <a:xfrm rot="10800000">
-            <a:off x="5218386" y="2551386"/>
-            <a:ext cx="1755228" cy="1755228"/>
-          </a:xfrm>
-          <a:prstGeom prst="rect">
-            <a:avLst/>
-          </a:prstGeom>
-        </p:spPr>
-      </p:pic>
-    </p:spTree>
-    <p:extLst>
-      <p:ext uri="{BB962C8B-B14F-4D97-AF65-F5344CB8AC3E}">
-        <p14:creationId xmlns:p14="http://schemas.microsoft.com/office/powerpoint/2010/main" val="2067269519"/>
-      </p:ext>
-    </p:extLst>
-  </p:cSld>
-  <p:clrMapOvr>
-    <a:masterClrMapping/>
-  </p:clrMapOvr>
-</p:sld>
-</file>
-
-<file path=ppt/slides/slide5.xml><?xml version="1.0" encoding="utf-8"?>
-<p:sld xmlns:a="http://schemas.openxmlformats.org/drawingml/2006/main" xmlns:r="http://schemas.openxmlformats.org/officeDocument/2006/relationships" xmlns:p="http://schemas.openxmlformats.org/presentationml/2006/main">
-  <p:cSld>
-    <p:spTree>
-      <p:nvGrpSpPr>
-        <p:cNvPr id="1" name=""/>
-        <p:cNvGrpSpPr/>
-        <p:nvPr/>
-      </p:nvGrpSpPr>
-      <p:grpSpPr>
-        <a:xfrm>
-          <a:off x="0" y="0"/>
-          <a:ext cx="0" cy="0"/>
-          <a:chOff x="0" y="0"/>
-          <a:chExt cx="0" cy="0"/>
-        </a:xfrm>
-      </p:grpSpPr>
-      <p:sp>
-        <p:nvSpPr>
-          <p:cNvPr id="2" name="TextBox 1">
-            <a:extLst>
-              <a:ext uri="{FF2B5EF4-FFF2-40B4-BE49-F238E27FC236}">
-                <a16:creationId xmlns:a16="http://schemas.microsoft.com/office/drawing/2014/main" id="{39D9F032-BA88-C233-03A9-217FFC9335E9}"/>
-              </a:ext>
-            </a:extLst>
-          </p:cNvPr>
-          <p:cNvSpPr txBox="1"/>
-          <p:nvPr/>
-        </p:nvSpPr>
-        <p:spPr>
-          <a:xfrm>
-            <a:off x="2371903" y="2228671"/>
-            <a:ext cx="7448193" cy="2400657"/>
-          </a:xfrm>
-          <a:prstGeom prst="rect">
-            <a:avLst/>
-          </a:prstGeom>
-          <a:noFill/>
-        </p:spPr>
-        <p:txBody>
-          <a:bodyPr wrap="none" rtlCol="0">
-            <a:spAutoFit/>
-          </a:bodyPr>
-          <a:lstStyle/>
-          <a:p>
-            <a:r>
-              <a:rPr lang="en-GB" sz="15000" dirty="0">
-                <a:solidFill>
-                  <a:srgbClr val="92D050"/>
-                </a:solidFill>
-              </a:rPr>
-              <a:t>CORRECT</a:t>
-            </a:r>
-            <a:endParaRPr lang="en-DK" sz="15000" dirty="0">
-              <a:solidFill>
-                <a:srgbClr val="92D050"/>
-              </a:solidFill>
-            </a:endParaRPr>
-          </a:p>
-        </p:txBody>
-      </p:sp>
-    </p:spTree>
-    <p:extLst>
-      <p:ext uri="{BB962C8B-B14F-4D97-AF65-F5344CB8AC3E}">
-        <p14:creationId xmlns:p14="http://schemas.microsoft.com/office/powerpoint/2010/main" val="3433367663"/>
-      </p:ext>
-    </p:extLst>
-  </p:cSld>
-  <p:clrMapOvr>
-    <a:masterClrMapping/>
-  </p:clrMapOvr>
-</p:sld>
-</file>
-
-<file path=ppt/slides/slide6.xml><?xml version="1.0" encoding="utf-8"?>
-<p:sld xmlns:a="http://schemas.openxmlformats.org/drawingml/2006/main" xmlns:r="http://schemas.openxmlformats.org/officeDocument/2006/relationships" xmlns:p="http://schemas.openxmlformats.org/presentationml/2006/main">
-  <p:cSld>
-    <p:spTree>
-      <p:nvGrpSpPr>
-        <p:cNvPr id="1" name=""/>
-        <p:cNvGrpSpPr/>
-        <p:nvPr/>
-      </p:nvGrpSpPr>
-      <p:grpSpPr>
-        <a:xfrm>
-          <a:off x="0" y="0"/>
-          <a:ext cx="0" cy="0"/>
-          <a:chOff x="0" y="0"/>
-          <a:chExt cx="0" cy="0"/>
-        </a:xfrm>
-      </p:grpSpPr>
-      <p:sp>
-        <p:nvSpPr>
-          <p:cNvPr id="2" name="TextBox 1">
-            <a:extLst>
-              <a:ext uri="{FF2B5EF4-FFF2-40B4-BE49-F238E27FC236}">
-                <a16:creationId xmlns:a16="http://schemas.microsoft.com/office/drawing/2014/main" id="{39D9F032-BA88-C233-03A9-217FFC9335E9}"/>
-              </a:ext>
-            </a:extLst>
-          </p:cNvPr>
-          <p:cNvSpPr txBox="1"/>
-          <p:nvPr/>
-        </p:nvSpPr>
-        <p:spPr>
-          <a:xfrm>
-            <a:off x="2769384" y="2228671"/>
-            <a:ext cx="6653232" cy="2400657"/>
-          </a:xfrm>
-          <a:prstGeom prst="rect">
-            <a:avLst/>
-          </a:prstGeom>
-          <a:noFill/>
-        </p:spPr>
-        <p:txBody>
-          <a:bodyPr wrap="none" rtlCol="0">
-            <a:spAutoFit/>
-          </a:bodyPr>
-          <a:lstStyle/>
-          <a:p>
-            <a:r>
-              <a:rPr lang="en-GB" sz="15000" dirty="0">
-                <a:solidFill>
-                  <a:srgbClr val="FF0000"/>
-                </a:solidFill>
-              </a:rPr>
-              <a:t>WRONG</a:t>
-            </a:r>
-            <a:endParaRPr lang="en-DK" sz="15000" dirty="0">
-              <a:solidFill>
-                <a:srgbClr val="FF0000"/>
-              </a:solidFill>
-            </a:endParaRPr>
-          </a:p>
-        </p:txBody>
-      </p:sp>
-    </p:spTree>
-    <p:extLst>
-      <p:ext uri="{BB962C8B-B14F-4D97-AF65-F5344CB8AC3E}">
-        <p14:creationId xmlns:p14="http://schemas.microsoft.com/office/powerpoint/2010/main" val="3340757031"/>
-      </p:ext>
-    </p:extLst>
-  </p:cSld>
-  <p:clrMapOvr>
-    <a:masterClrMapping/>
-  </p:clrMapOvr>
-</p:sld>
-</file>
-
-<file path=ppt/slides/slide7.xml><?xml version="1.0" encoding="utf-8"?>
-<p:sld xmlns:a="http://schemas.openxmlformats.org/drawingml/2006/main" xmlns:r="http://schemas.openxmlformats.org/officeDocument/2006/relationships" xmlns:p="http://schemas.openxmlformats.org/presentationml/2006/main">
-  <p:cSld>
-    <p:spTree>
-      <p:nvGrpSpPr>
-        <p:cNvPr id="1" name=""/>
-        <p:cNvGrpSpPr/>
-        <p:nvPr/>
-      </p:nvGrpSpPr>
-      <p:grpSpPr>
-        <a:xfrm>
-          <a:off x="0" y="0"/>
-          <a:ext cx="0" cy="0"/>
-          <a:chOff x="0" y="0"/>
-          <a:chExt cx="0" cy="0"/>
-        </a:xfrm>
-      </p:grpSpPr>
-      <p:sp>
-        <p:nvSpPr>
-          <p:cNvPr id="2" name="TextBox 1">
-            <a:extLst>
-              <a:ext uri="{FF2B5EF4-FFF2-40B4-BE49-F238E27FC236}">
-                <a16:creationId xmlns:a16="http://schemas.microsoft.com/office/drawing/2014/main" id="{AF388601-D0F5-FFE8-CB40-EB018A70D49F}"/>
-              </a:ext>
-            </a:extLst>
-          </p:cNvPr>
-          <p:cNvSpPr txBox="1"/>
-          <p:nvPr/>
-        </p:nvSpPr>
-        <p:spPr>
-          <a:xfrm>
-            <a:off x="646761" y="286140"/>
-            <a:ext cx="10898477" cy="6268639"/>
-          </a:xfrm>
-          <a:prstGeom prst="rect">
-            <a:avLst/>
-          </a:prstGeom>
-          <a:noFill/>
-        </p:spPr>
-        <p:txBody>
-          <a:bodyPr wrap="square" rtlCol="0">
-            <a:spAutoFit/>
-          </a:bodyPr>
-          <a:lstStyle/>
-          <a:p>
-            <a:pPr algn="ctr"/>
-            <a:r>
-              <a:rPr lang="en-GB" sz="4000" b="1" dirty="0"/>
-              <a:t>Instructions</a:t>
-            </a:r>
-          </a:p>
-          <a:p>
-            <a:pPr marL="285750" indent="-285750">
-              <a:lnSpc>
-                <a:spcPct val="110000"/>
-              </a:lnSpc>
-              <a:buFont typeface="Arial" panose="020B0604020202020204" pitchFamily="34" charset="0"/>
-              <a:buChar char="•"/>
-            </a:pPr>
-            <a:r>
-              <a:rPr lang="en-GB" sz="3000" dirty="0"/>
-              <a:t>In this task, you must respond as quickly and accurately as possible to a left or right-pointing arrow. You respond by pressing the keys of your pad with your left and right index fingers, respectively. </a:t>
-            </a:r>
-          </a:p>
-          <a:p>
-            <a:pPr marL="285750" indent="-285750">
-              <a:lnSpc>
-                <a:spcPct val="110000"/>
-              </a:lnSpc>
-              <a:buFont typeface="Arial" panose="020B0604020202020204" pitchFamily="34" charset="0"/>
-              <a:buChar char="•"/>
-            </a:pPr>
-            <a:r>
-              <a:rPr lang="en-GB" sz="3000" dirty="0"/>
-              <a:t>You have only up to half a second to respond, which is very short, so you must be ready for the task, which requires your full attention.</a:t>
-            </a:r>
-          </a:p>
-          <a:p>
-            <a:pPr marL="285750" indent="-285750">
-              <a:lnSpc>
-                <a:spcPct val="110000"/>
-              </a:lnSpc>
-              <a:buFont typeface="Arial" panose="020B0604020202020204" pitchFamily="34" charset="0"/>
-              <a:buChar char="•"/>
-            </a:pPr>
-            <a:r>
-              <a:rPr lang="en-GB" sz="3000" dirty="0"/>
-              <a:t>However, if you hear a SOUND, you should NOT RESPOND!</a:t>
-            </a:r>
-          </a:p>
-          <a:p>
-            <a:pPr marL="285750" indent="-285750">
-              <a:lnSpc>
-                <a:spcPct val="110000"/>
-              </a:lnSpc>
-              <a:buFont typeface="Arial" panose="020B0604020202020204" pitchFamily="34" charset="0"/>
-              <a:buChar char="•"/>
-            </a:pPr>
-            <a:r>
-              <a:rPr lang="en-GB" sz="3000" dirty="0"/>
-              <a:t>It seems easy, but it is actually very difficult. Additionally, the computer will adjust the task speed based on your performance during the task; this means that sometimes, it will be difficult for you not to respond. </a:t>
-            </a:r>
-          </a:p>
-        </p:txBody>
-      </p:sp>
-    </p:spTree>
-    <p:extLst>
-      <p:ext uri="{BB962C8B-B14F-4D97-AF65-F5344CB8AC3E}">
-        <p14:creationId xmlns:p14="http://schemas.microsoft.com/office/powerpoint/2010/main" val="825739660"/>
       </p:ext>
     </p:extLst>
   </p:cSld>

</xml_diff>

<commit_message>
Added instructions for the Go task
</commit_message>
<xml_diff>
--- a/docs/vstopsignal/Images.pptx
+++ b/docs/vstopsignal/Images.pptx
@@ -14,6 +14,7 @@
     <p:sldId id="265" r:id="rId8"/>
     <p:sldId id="263" r:id="rId9"/>
     <p:sldId id="264" r:id="rId10"/>
+    <p:sldId id="266" r:id="rId11"/>
   </p:sldIdLst>
   <p:sldSz cx="12192000" cy="6858000"/>
   <p:notesSz cx="6858000" cy="9144000"/>
@@ -611,6 +612,115 @@
     <p:extLst>
       <p:ext uri="{BB962C8B-B14F-4D97-AF65-F5344CB8AC3E}">
         <p14:creationId xmlns:p14="http://schemas.microsoft.com/office/powerpoint/2010/main" val="2220615399"/>
+      </p:ext>
+    </p:extLst>
+  </p:cSld>
+  <p:clrMapOvr>
+    <a:masterClrMapping/>
+  </p:clrMapOvr>
+</p:sld>
+</file>
+
+<file path=ppt/slides/slide10.xml><?xml version="1.0" encoding="utf-8"?>
+<p:sld xmlns:a="http://schemas.openxmlformats.org/drawingml/2006/main" xmlns:r="http://schemas.openxmlformats.org/officeDocument/2006/relationships" xmlns:p="http://schemas.openxmlformats.org/presentationml/2006/main">
+  <p:cSld>
+    <p:spTree>
+      <p:nvGrpSpPr>
+        <p:cNvPr id="1" name=""/>
+        <p:cNvGrpSpPr/>
+        <p:nvPr/>
+      </p:nvGrpSpPr>
+      <p:grpSpPr>
+        <a:xfrm>
+          <a:off x="0" y="0"/>
+          <a:ext cx="0" cy="0"/>
+          <a:chOff x="0" y="0"/>
+          <a:chExt cx="0" cy="0"/>
+        </a:xfrm>
+      </p:grpSpPr>
+      <p:sp>
+        <p:nvSpPr>
+          <p:cNvPr id="2" name="TextBox 1">
+            <a:extLst>
+              <a:ext uri="{FF2B5EF4-FFF2-40B4-BE49-F238E27FC236}">
+                <a16:creationId xmlns:a16="http://schemas.microsoft.com/office/drawing/2014/main" id="{AF388601-D0F5-FFE8-CB40-EB018A70D49F}"/>
+              </a:ext>
+            </a:extLst>
+          </p:cNvPr>
+          <p:cNvSpPr txBox="1"/>
+          <p:nvPr/>
+        </p:nvSpPr>
+        <p:spPr>
+          <a:xfrm>
+            <a:off x="646761" y="286140"/>
+            <a:ext cx="10898477" cy="4237314"/>
+          </a:xfrm>
+          <a:prstGeom prst="rect">
+            <a:avLst/>
+          </a:prstGeom>
+          <a:noFill/>
+        </p:spPr>
+        <p:txBody>
+          <a:bodyPr wrap="square" rtlCol="0">
+            <a:spAutoFit/>
+          </a:bodyPr>
+          <a:lstStyle/>
+          <a:p>
+            <a:pPr algn="ctr"/>
+            <a:r>
+              <a:rPr lang="en-GB" sz="4000" b="1" dirty="0"/>
+              <a:t>Instructions</a:t>
+            </a:r>
+          </a:p>
+          <a:p>
+            <a:pPr marL="285750" indent="-285750">
+              <a:lnSpc>
+                <a:spcPct val="110000"/>
+              </a:lnSpc>
+              <a:buFont typeface="Arial" panose="020B0604020202020204" pitchFamily="34" charset="0"/>
+              <a:buChar char="•"/>
+            </a:pPr>
+            <a:r>
+              <a:rPr lang="en-GB" sz="3000" dirty="0"/>
+              <a:t>In this task, you must respond quickly and accurately to a left or right-pointing arrow. </a:t>
+            </a:r>
+          </a:p>
+          <a:p>
+            <a:pPr marL="285750" indent="-285750">
+              <a:lnSpc>
+                <a:spcPct val="110000"/>
+              </a:lnSpc>
+              <a:buFont typeface="Arial" panose="020B0604020202020204" pitchFamily="34" charset="0"/>
+              <a:buChar char="•"/>
+            </a:pPr>
+            <a:r>
+              <a:rPr lang="en-GB" sz="3000"/>
+              <a:t>You </a:t>
+            </a:r>
+            <a:r>
+              <a:rPr lang="en-GB" sz="3000" dirty="0"/>
+              <a:t>respond by pressing the keys of your pad with your left and right index fingers, respectively. </a:t>
+            </a:r>
+          </a:p>
+          <a:p>
+            <a:pPr marL="285750" indent="-285750">
+              <a:lnSpc>
+                <a:spcPct val="110000"/>
+              </a:lnSpc>
+              <a:buFont typeface="Arial" panose="020B0604020202020204" pitchFamily="34" charset="0"/>
+              <a:buChar char="•"/>
+            </a:pPr>
+            <a:r>
+              <a:rPr lang="en-GB" sz="3000" dirty="0"/>
+              <a:t>You have only up to half a second to respond, which is very short, so you must be ready for the task, which requires your full attention.</a:t>
+            </a:r>
+          </a:p>
+        </p:txBody>
+      </p:sp>
+    </p:spTree>
+    <p:extLst>
+      <p:ext uri="{BB962C8B-B14F-4D97-AF65-F5344CB8AC3E}">
+        <p14:creationId xmlns:p14="http://schemas.microsoft.com/office/powerpoint/2010/main" val="2137359767"/>
       </p:ext>
     </p:extLst>
   </p:cSld>

</xml_diff>